<commit_message>
Fix typos and other small mistakes
</commit_message>
<xml_diff>
--- a/6.pptx
+++ b/6.pptx
@@ -220,7 +220,7 @@
           <a:p>
             <a:fld id="{8EA2FFFB-FF04-4951-AFFB-2953F8C927C4}" type="datetimeFigureOut">
               <a:rPr lang="en-GB" smtClean="0"/>
-              <a:t>27/11/2025</a:t>
+              <a:t>03/12/2025</a:t>
             </a:fld>
             <a:endParaRPr lang="en-GB"/>
           </a:p>
@@ -753,7 +753,7 @@
           <a:p>
             <a:fld id="{0642860B-0964-4C95-BF1A-62834899E920}" type="datetimeFigureOut">
               <a:rPr lang="en-GB" smtClean="0"/>
-              <a:t>27/11/2025</a:t>
+              <a:t>03/12/2025</a:t>
             </a:fld>
             <a:endParaRPr lang="en-GB"/>
           </a:p>
@@ -923,7 +923,7 @@
           <a:p>
             <a:fld id="{0642860B-0964-4C95-BF1A-62834899E920}" type="datetimeFigureOut">
               <a:rPr lang="en-GB" smtClean="0"/>
-              <a:t>27/11/2025</a:t>
+              <a:t>03/12/2025</a:t>
             </a:fld>
             <a:endParaRPr lang="en-GB"/>
           </a:p>
@@ -1103,7 +1103,7 @@
           <a:p>
             <a:fld id="{0642860B-0964-4C95-BF1A-62834899E920}" type="datetimeFigureOut">
               <a:rPr lang="en-GB" smtClean="0"/>
-              <a:t>27/11/2025</a:t>
+              <a:t>03/12/2025</a:t>
             </a:fld>
             <a:endParaRPr lang="en-GB"/>
           </a:p>
@@ -1273,7 +1273,7 @@
           <a:p>
             <a:fld id="{0642860B-0964-4C95-BF1A-62834899E920}" type="datetimeFigureOut">
               <a:rPr lang="en-GB" smtClean="0"/>
-              <a:t>27/11/2025</a:t>
+              <a:t>03/12/2025</a:t>
             </a:fld>
             <a:endParaRPr lang="en-GB"/>
           </a:p>
@@ -1519,7 +1519,7 @@
           <a:p>
             <a:fld id="{0642860B-0964-4C95-BF1A-62834899E920}" type="datetimeFigureOut">
               <a:rPr lang="en-GB" smtClean="0"/>
-              <a:t>27/11/2025</a:t>
+              <a:t>03/12/2025</a:t>
             </a:fld>
             <a:endParaRPr lang="en-GB"/>
           </a:p>
@@ -1807,7 +1807,7 @@
           <a:p>
             <a:fld id="{0642860B-0964-4C95-BF1A-62834899E920}" type="datetimeFigureOut">
               <a:rPr lang="en-GB" smtClean="0"/>
-              <a:t>27/11/2025</a:t>
+              <a:t>03/12/2025</a:t>
             </a:fld>
             <a:endParaRPr lang="en-GB"/>
           </a:p>
@@ -2229,7 +2229,7 @@
           <a:p>
             <a:fld id="{0642860B-0964-4C95-BF1A-62834899E920}" type="datetimeFigureOut">
               <a:rPr lang="en-GB" smtClean="0"/>
-              <a:t>27/11/2025</a:t>
+              <a:t>03/12/2025</a:t>
             </a:fld>
             <a:endParaRPr lang="en-GB"/>
           </a:p>
@@ -2347,7 +2347,7 @@
           <a:p>
             <a:fld id="{0642860B-0964-4C95-BF1A-62834899E920}" type="datetimeFigureOut">
               <a:rPr lang="en-GB" smtClean="0"/>
-              <a:t>27/11/2025</a:t>
+              <a:t>03/12/2025</a:t>
             </a:fld>
             <a:endParaRPr lang="en-GB"/>
           </a:p>
@@ -2442,7 +2442,7 @@
           <a:p>
             <a:fld id="{0642860B-0964-4C95-BF1A-62834899E920}" type="datetimeFigureOut">
               <a:rPr lang="en-GB" smtClean="0"/>
-              <a:t>27/11/2025</a:t>
+              <a:t>03/12/2025</a:t>
             </a:fld>
             <a:endParaRPr lang="en-GB"/>
           </a:p>
@@ -2719,7 +2719,7 @@
           <a:p>
             <a:fld id="{0642860B-0964-4C95-BF1A-62834899E920}" type="datetimeFigureOut">
               <a:rPr lang="en-GB" smtClean="0"/>
-              <a:t>27/11/2025</a:t>
+              <a:t>03/12/2025</a:t>
             </a:fld>
             <a:endParaRPr lang="en-GB"/>
           </a:p>
@@ -2972,7 +2972,7 @@
           <a:p>
             <a:fld id="{0642860B-0964-4C95-BF1A-62834899E920}" type="datetimeFigureOut">
               <a:rPr lang="en-GB" smtClean="0"/>
-              <a:t>27/11/2025</a:t>
+              <a:t>03/12/2025</a:t>
             </a:fld>
             <a:endParaRPr lang="en-GB"/>
           </a:p>
@@ -3185,7 +3185,7 @@
           <a:p>
             <a:fld id="{0642860B-0964-4C95-BF1A-62834899E920}" type="datetimeFigureOut">
               <a:rPr lang="en-GB" smtClean="0"/>
-              <a:t>27/11/2025</a:t>
+              <a:t>03/12/2025</a:t>
             </a:fld>
             <a:endParaRPr lang="en-GB"/>
           </a:p>
@@ -7771,7 +7771,11 @@
             </a:r>
             <a:r>
               <a:rPr lang="hu-HU" sz="1400" dirty="0" smtClean="0"/>
-              <a:t> t’ </a:t>
+              <a:t> </a:t>
+            </a:r>
+            <a:r>
+              <a:rPr lang="hu-HU" sz="1400" i="1" dirty="0" smtClean="0"/>
+              <a:t>t’ </a:t>
             </a:r>
             <a:r>
               <a:rPr lang="hu-HU" sz="1400" dirty="0" err="1" smtClean="0"/>
@@ -7803,7 +7807,11 @@
             </a:r>
             <a:r>
               <a:rPr lang="hu-HU" sz="1400" dirty="0" smtClean="0"/>
-              <a:t> a V </a:t>
+              <a:t> a </a:t>
+            </a:r>
+            <a:r>
+              <a:rPr lang="hu-HU" sz="1400" i="1" dirty="0" smtClean="0"/>
+              <a:t>V </a:t>
             </a:r>
             <a:r>
               <a:rPr lang="hu-HU" sz="1400" dirty="0" err="1" smtClean="0"/>
@@ -8222,7 +8230,11 @@
             </a:r>
             <a:r>
               <a:rPr lang="hu-HU" dirty="0" smtClean="0"/>
-              <a:t> sum of </a:t>
+              <a:t> sum </a:t>
+            </a:r>
+            <a:r>
+              <a:rPr lang="hu-HU" dirty="0" smtClean="0"/>
+              <a:t>of </a:t>
             </a:r>
             <a:r>
               <a:rPr lang="hu-HU" dirty="0" err="1" smtClean="0"/>
@@ -8250,90 +8262,66 @@
             </a:r>
             <a:r>
               <a:rPr lang="hu-HU" dirty="0" err="1" smtClean="0"/>
+              <a:t>all</a:t>
+            </a:r>
+            <a:r>
+              <a:rPr lang="hu-HU" dirty="0" smtClean="0"/>
+              <a:t> input </a:t>
+            </a:r>
+            <a:r>
+              <a:rPr lang="hu-HU" dirty="0" err="1" smtClean="0"/>
+              <a:t>tokens</a:t>
+            </a:r>
+            <a:r>
+              <a:rPr lang="hu-HU" dirty="0" smtClean="0"/>
+              <a:t>, </a:t>
+            </a:r>
+            <a:r>
+              <a:rPr lang="hu-HU" dirty="0" err="1" smtClean="0"/>
+              <a:t>including</a:t>
+            </a:r>
+            <a:r>
+              <a:rPr lang="hu-HU" dirty="0" smtClean="0"/>
+              <a:t> </a:t>
+            </a:r>
+            <a:r>
+              <a:rPr lang="hu-HU" dirty="0" err="1" smtClean="0"/>
+              <a:t>itself</a:t>
+            </a:r>
+            <a:r>
+              <a:rPr lang="hu-HU" dirty="0" smtClean="0"/>
+              <a:t>, </a:t>
+            </a:r>
+            <a:r>
+              <a:rPr lang="hu-HU" dirty="0" err="1" smtClean="0"/>
+              <a:t>previously</a:t>
+            </a:r>
+            <a:r>
+              <a:rPr lang="hu-HU" dirty="0" smtClean="0"/>
+              <a:t> </a:t>
+            </a:r>
+            <a:r>
+              <a:rPr lang="hu-HU" dirty="0" err="1" smtClean="0"/>
+              <a:t>weighted</a:t>
+            </a:r>
+            <a:r>
+              <a:rPr lang="hu-HU" dirty="0" smtClean="0"/>
+              <a:t> </a:t>
+            </a:r>
+            <a:r>
+              <a:rPr lang="hu-HU" dirty="0" err="1" smtClean="0"/>
+              <a:t>by</a:t>
+            </a:r>
+            <a:r>
+              <a:rPr lang="hu-HU" dirty="0" smtClean="0"/>
+              <a:t> </a:t>
+            </a:r>
+            <a:r>
+              <a:rPr lang="hu-HU" dirty="0" err="1" smtClean="0"/>
               <a:t>the</a:t>
             </a:r>
             <a:r>
               <a:rPr lang="hu-HU" dirty="0" smtClean="0"/>
-              <a:t> </a:t>
-            </a:r>
-            <a:r>
-              <a:rPr lang="hu-HU" dirty="0" err="1" smtClean="0"/>
-              <a:t>vectors</a:t>
-            </a:r>
-            <a:r>
-              <a:rPr lang="hu-HU" dirty="0" smtClean="0"/>
-              <a:t> </a:t>
-            </a:r>
-            <a:r>
-              <a:rPr lang="hu-HU" dirty="0" err="1" smtClean="0"/>
-              <a:t>of</a:t>
-            </a:r>
-            <a:r>
-              <a:rPr lang="hu-HU" dirty="0" smtClean="0"/>
-              <a:t> </a:t>
-            </a:r>
-            <a:r>
-              <a:rPr lang="hu-HU" dirty="0" err="1" smtClean="0"/>
-              <a:t>all</a:t>
-            </a:r>
-            <a:r>
-              <a:rPr lang="hu-HU" dirty="0" smtClean="0"/>
-              <a:t> input </a:t>
-            </a:r>
-            <a:r>
-              <a:rPr lang="hu-HU" dirty="0" err="1" smtClean="0"/>
-              <a:t>tokens</a:t>
-            </a:r>
-            <a:r>
-              <a:rPr lang="hu-HU" dirty="0" smtClean="0"/>
-              <a:t>, </a:t>
-            </a:r>
-            <a:r>
-              <a:rPr lang="hu-HU" dirty="0" err="1" smtClean="0"/>
-              <a:t>including</a:t>
-            </a:r>
-            <a:r>
-              <a:rPr lang="hu-HU" dirty="0" smtClean="0"/>
-              <a:t> </a:t>
-            </a:r>
-            <a:r>
-              <a:rPr lang="hu-HU" dirty="0" err="1" smtClean="0"/>
-              <a:t>itself</a:t>
-            </a:r>
-            <a:r>
-              <a:rPr lang="hu-HU" dirty="0" smtClean="0"/>
-              <a:t>, </a:t>
-            </a:r>
-            <a:r>
-              <a:rPr lang="hu-HU" dirty="0" err="1" smtClean="0"/>
-              <a:t>previously</a:t>
-            </a:r>
-            <a:r>
-              <a:rPr lang="hu-HU" dirty="0" smtClean="0"/>
-              <a:t> </a:t>
-            </a:r>
-            <a:r>
-              <a:rPr lang="hu-HU" dirty="0" err="1" smtClean="0"/>
-              <a:t>weighted</a:t>
-            </a:r>
-            <a:r>
-              <a:rPr lang="hu-HU" dirty="0" smtClean="0"/>
-              <a:t> </a:t>
-            </a:r>
-            <a:r>
-              <a:rPr lang="hu-HU" dirty="0" err="1" smtClean="0"/>
-              <a:t>by</a:t>
-            </a:r>
-            <a:r>
-              <a:rPr lang="hu-HU" dirty="0" smtClean="0"/>
-              <a:t> </a:t>
-            </a:r>
-            <a:r>
-              <a:rPr lang="hu-HU" dirty="0" err="1" smtClean="0"/>
-              <a:t>the</a:t>
-            </a:r>
-            <a:r>
-              <a:rPr lang="hu-HU" dirty="0" smtClean="0"/>
               <a:t> V </a:t>
             </a:r>
             <a:r>
@@ -8372,7 +8360,15 @@
             </a:r>
             <a:r>
               <a:rPr lang="en-GB" dirty="0"/>
-              <a:t>not one such weighted sum (Value, V) per input, but </a:t>
+              <a:t>not one such weighted sum </a:t>
+            </a:r>
+            <a:r>
+              <a:rPr lang="en-GB" dirty="0" smtClean="0"/>
+              <a:t>per </a:t>
+            </a:r>
+            <a:r>
+              <a:rPr lang="en-GB" dirty="0"/>
+              <a:t>input, but </a:t>
             </a:r>
             <a:r>
               <a:rPr lang="en-GB" i="1" dirty="0"/>
@@ -9831,7 +9827,7 @@
             </a:r>
             <a:r>
               <a:rPr lang="hu-HU" sz="3400" dirty="0" err="1" smtClean="0"/>
-              <a:t>attensions</a:t>
+              <a:t>attentions</a:t>
             </a:r>
             <a:r>
               <a:rPr lang="hu-HU" sz="3400" dirty="0" smtClean="0"/>
@@ -11127,11 +11123,47 @@
             </a:r>
             <a:r>
               <a:rPr lang="hu-HU" b="1" dirty="0" err="1" smtClean="0"/>
+              <a:t>encoding</a:t>
+            </a:r>
+            <a:r>
+              <a:rPr lang="hu-HU" b="1" dirty="0" smtClean="0"/>
+              <a:t> </a:t>
+            </a:r>
+            <a:r>
+              <a:rPr lang="hu-HU" dirty="0" smtClean="0"/>
+              <a:t>(</a:t>
+            </a:r>
+            <a:r>
+              <a:rPr lang="hu-HU" dirty="0" err="1" smtClean="0"/>
+              <a:t>sometimes</a:t>
+            </a:r>
+            <a:r>
+              <a:rPr lang="hu-HU" dirty="0" smtClean="0"/>
+              <a:t> </a:t>
+            </a:r>
+            <a:r>
+              <a:rPr lang="hu-HU" dirty="0" err="1" smtClean="0"/>
+              <a:t>also</a:t>
+            </a:r>
+            <a:r>
+              <a:rPr lang="hu-HU" dirty="0" smtClean="0"/>
+              <a:t> </a:t>
+            </a:r>
+            <a:r>
+              <a:rPr lang="hu-HU" dirty="0" err="1" smtClean="0"/>
+              <a:t>called</a:t>
+            </a:r>
+            <a:r>
+              <a:rPr lang="hu-HU" dirty="0" smtClean="0"/>
+              <a:t> </a:t>
+            </a:r>
+            <a:r>
+              <a:rPr lang="hu-HU" dirty="0" err="1" smtClean="0"/>
               <a:t>embedding</a:t>
             </a:r>
             <a:r>
-              <a:rPr lang="hu-HU" b="1" dirty="0" smtClean="0"/>
-              <a:t> </a:t>
+              <a:rPr lang="hu-HU" dirty="0" smtClean="0"/>
+              <a:t>) </a:t>
             </a:r>
             <a:r>
               <a:rPr lang="hu-HU" b="1" dirty="0" err="1" smtClean="0"/>
@@ -11453,7 +11485,7 @@
             </a:r>
             <a:r>
               <a:rPr lang="hu-HU" dirty="0" err="1" smtClean="0"/>
-              <a:t>expresses</a:t>
+              <a:t>encodes</a:t>
             </a:r>
             <a:r>
               <a:rPr lang="hu-HU" dirty="0" smtClean="0"/>
@@ -14864,11 +14896,7 @@
             </a:r>
             <a:r>
               <a:rPr lang="hu-HU" dirty="0" smtClean="0"/>
-              <a:t> </a:t>
-            </a:r>
-            <a:r>
-              <a:rPr lang="hu-HU" dirty="0" smtClean="0"/>
-              <a:t>and </a:t>
+              <a:t> and </a:t>
             </a:r>
             <a:r>
               <a:rPr lang="hu-HU" dirty="0" err="1" smtClean="0"/>
@@ -16094,6 +16122,18 @@
               <a:t> </a:t>
             </a:r>
             <a:r>
+              <a:rPr lang="hu-HU" dirty="0" smtClean="0"/>
+              <a:t>(</a:t>
+            </a:r>
+            <a:r>
+              <a:rPr lang="hu-HU" dirty="0" err="1" smtClean="0"/>
+              <a:t>e.g</a:t>
+            </a:r>
+            <a:r>
+              <a:rPr lang="hu-HU" dirty="0" smtClean="0"/>
+              <a:t>.) </a:t>
+            </a:r>
+            <a:r>
               <a:rPr lang="hu-HU" dirty="0" err="1" smtClean="0"/>
               <a:t>classification</a:t>
             </a:r>
@@ -16240,7 +16280,12 @@
             <p:ph idx="1"/>
           </p:nvPr>
         </p:nvSpPr>
-        <p:spPr/>
+        <p:spPr>
+          <a:xfrm>
+            <a:off x="457200" y="1600200"/>
+            <a:ext cx="8291264" cy="4637112"/>
+          </a:xfrm>
+        </p:spPr>
         <p:txBody>
           <a:bodyPr>
             <a:normAutofit fontScale="70000" lnSpcReduction="20000"/>
@@ -16331,43 +16376,11 @@
             </a:r>
             <a:r>
               <a:rPr lang="hu-HU" dirty="0" err="1" smtClean="0"/>
-              <a:t>words</a:t>
-            </a:r>
-            <a:r>
-              <a:rPr lang="hu-HU" dirty="0" smtClean="0"/>
-              <a:t> (</a:t>
-            </a:r>
-            <a:r>
-              <a:rPr lang="hu-HU" dirty="0" err="1" smtClean="0"/>
-              <a:t>consisting</a:t>
-            </a:r>
-            <a:r>
-              <a:rPr lang="hu-HU" dirty="0" smtClean="0"/>
-              <a:t> of </a:t>
-            </a:r>
-            <a:r>
-              <a:rPr lang="hu-HU" dirty="0" err="1" smtClean="0"/>
-              <a:t>one</a:t>
-            </a:r>
-            <a:r>
-              <a:rPr lang="hu-HU" dirty="0" smtClean="0"/>
-              <a:t> </a:t>
-            </a:r>
-            <a:r>
-              <a:rPr lang="hu-HU" dirty="0" err="1" smtClean="0"/>
-              <a:t>or</a:t>
-            </a:r>
-            <a:r>
-              <a:rPr lang="hu-HU" dirty="0" smtClean="0"/>
-              <a:t> more </a:t>
-            </a:r>
-            <a:r>
-              <a:rPr lang="hu-HU" dirty="0" err="1" smtClean="0"/>
               <a:t>tokens</a:t>
             </a:r>
             <a:r>
               <a:rPr lang="hu-HU" dirty="0" smtClean="0"/>
-              <a:t>) </a:t>
+              <a:t> </a:t>
             </a:r>
             <a:r>
               <a:rPr lang="hu-HU" dirty="0" err="1" smtClean="0"/>
@@ -16434,12 +16447,16 @@
               <a:t> a </a:t>
             </a:r>
             <a:r>
+              <a:rPr lang="hu-HU" dirty="0" smtClean="0"/>
+              <a:t>[</a:t>
+            </a:r>
+            <a:r>
               <a:rPr lang="hu-HU" dirty="0" err="1" smtClean="0"/>
               <a:t>MASK</a:t>
             </a:r>
             <a:r>
               <a:rPr lang="hu-HU" dirty="0" smtClean="0"/>
-              <a:t> </a:t>
+              <a:t>] </a:t>
             </a:r>
             <a:r>
               <a:rPr lang="hu-HU" dirty="0" err="1" smtClean="0"/>
@@ -16507,10 +16524,89 @@
             <a:endParaRPr lang="hu-HU" i="1" dirty="0" smtClean="0"/>
           </a:p>
           <a:p>
+            <a:pPr lvl="2"/>
+            <a:r>
+              <a:rPr lang="hu-HU" dirty="0" smtClean="0"/>
+              <a:t>The </a:t>
+            </a:r>
+            <a:r>
+              <a:rPr lang="hu-HU" dirty="0" err="1" smtClean="0"/>
+              <a:t>same</a:t>
+            </a:r>
+            <a:r>
+              <a:rPr lang="hu-HU" dirty="0" smtClean="0"/>
+              <a:t> </a:t>
+            </a:r>
+            <a:r>
+              <a:rPr lang="hu-HU" dirty="0" err="1" smtClean="0"/>
+              <a:t>task</a:t>
+            </a:r>
+            <a:r>
+              <a:rPr lang="hu-HU" dirty="0" smtClean="0"/>
+              <a:t> is </a:t>
+            </a:r>
+            <a:r>
+              <a:rPr lang="hu-HU" dirty="0" err="1" smtClean="0"/>
+              <a:t>known</a:t>
+            </a:r>
+            <a:r>
+              <a:rPr lang="hu-HU" dirty="0" smtClean="0"/>
+              <a:t> </a:t>
+            </a:r>
+            <a:r>
+              <a:rPr lang="hu-HU" dirty="0" err="1" smtClean="0"/>
+              <a:t>in</a:t>
+            </a:r>
+            <a:r>
+              <a:rPr lang="hu-HU" dirty="0" smtClean="0"/>
+              <a:t> </a:t>
+            </a:r>
+            <a:r>
+              <a:rPr lang="hu-HU" dirty="0" err="1" smtClean="0"/>
+              <a:t>language</a:t>
+            </a:r>
+            <a:r>
+              <a:rPr lang="hu-HU" dirty="0" smtClean="0"/>
+              <a:t> </a:t>
+            </a:r>
+            <a:r>
+              <a:rPr lang="hu-HU" dirty="0" err="1" smtClean="0"/>
+              <a:t>learning</a:t>
+            </a:r>
+            <a:r>
+              <a:rPr lang="hu-HU" dirty="0" smtClean="0"/>
+              <a:t> and testing </a:t>
+            </a:r>
+            <a:r>
+              <a:rPr lang="hu-HU" dirty="0" err="1" smtClean="0"/>
+              <a:t>as</a:t>
+            </a:r>
+            <a:r>
+              <a:rPr lang="hu-HU" dirty="0" smtClean="0"/>
+              <a:t> a </a:t>
+            </a:r>
+            <a:r>
+              <a:rPr lang="hu-HU" dirty="0" err="1" smtClean="0"/>
+              <a:t>cloze</a:t>
+            </a:r>
+            <a:r>
+              <a:rPr lang="hu-HU" dirty="0" smtClean="0"/>
+              <a:t> test.</a:t>
+            </a:r>
+          </a:p>
+          <a:p>
             <a:pPr lvl="1"/>
             <a:r>
-              <a:rPr lang="hu-HU" dirty="0" smtClean="0"/>
-              <a:t>A </a:t>
+              <a:rPr lang="hu-HU" dirty="0" err="1" smtClean="0"/>
+              <a:t>We</a:t>
+            </a:r>
+            <a:r>
+              <a:rPr lang="hu-HU" dirty="0" smtClean="0"/>
+              <a:t> add a</a:t>
+            </a:r>
+            <a:r>
+              <a:rPr lang="hu-HU" dirty="0" smtClean="0"/>
+              <a:t> </a:t>
             </a:r>
             <a:r>
               <a:rPr lang="hu-HU" b="1" dirty="0" err="1" smtClean="0"/>
@@ -16526,15 +16622,71 @@
             </a:r>
             <a:r>
               <a:rPr lang="hu-HU" dirty="0" smtClean="0"/>
-              <a:t> is </a:t>
-            </a:r>
-            <a:r>
-              <a:rPr lang="hu-HU" dirty="0" err="1" smtClean="0"/>
-              <a:t>added</a:t>
-            </a:r>
-            <a:r>
-              <a:rPr lang="hu-HU" dirty="0" smtClean="0"/>
-              <a:t> </a:t>
+              <a:t> </a:t>
+            </a:r>
+            <a:r>
+              <a:rPr lang="hu-HU" dirty="0" smtClean="0"/>
+              <a:t>(a </a:t>
+            </a:r>
+            <a:r>
+              <a:rPr lang="hu-HU" i="1" dirty="0" smtClean="0"/>
+              <a:t>k</a:t>
+            </a:r>
+            <a:r>
+              <a:rPr lang="hu-HU" dirty="0" smtClean="0"/>
+              <a:t> x </a:t>
+            </a:r>
+            <a:r>
+              <a:rPr lang="hu-HU" i="1" dirty="0" smtClean="0"/>
+              <a:t>V </a:t>
+            </a:r>
+            <a:r>
+              <a:rPr lang="hu-HU" dirty="0" err="1" smtClean="0"/>
+              <a:t>densely</a:t>
+            </a:r>
+            <a:r>
+              <a:rPr lang="hu-HU" dirty="0" smtClean="0"/>
+              <a:t> </a:t>
+            </a:r>
+            <a:r>
+              <a:rPr lang="hu-HU" dirty="0" err="1" smtClean="0"/>
+              <a:t>connected</a:t>
+            </a:r>
+            <a:r>
+              <a:rPr lang="hu-HU" dirty="0" smtClean="0"/>
+              <a:t> </a:t>
+            </a:r>
+            <a:r>
+              <a:rPr lang="hu-HU" dirty="0" err="1" smtClean="0"/>
+              <a:t>layer</a:t>
+            </a:r>
+            <a:r>
+              <a:rPr lang="hu-HU" dirty="0" smtClean="0"/>
+              <a:t> </a:t>
+            </a:r>
+            <a:r>
+              <a:rPr lang="hu-HU" dirty="0" err="1" smtClean="0"/>
+              <a:t>with</a:t>
+            </a:r>
+            <a:r>
+              <a:rPr lang="hu-HU" dirty="0" smtClean="0"/>
+              <a:t> </a:t>
+            </a:r>
+            <a:r>
+              <a:rPr lang="hu-HU" dirty="0" err="1" smtClean="0"/>
+              <a:t>softmax</a:t>
+            </a:r>
+            <a:r>
+              <a:rPr lang="hu-HU" dirty="0" smtClean="0"/>
+              <a:t> </a:t>
+            </a:r>
+            <a:r>
+              <a:rPr lang="hu-HU" dirty="0" err="1" smtClean="0"/>
+              <a:t>activation</a:t>
+            </a:r>
+            <a:r>
+              <a:rPr lang="hu-HU" dirty="0" smtClean="0"/>
+              <a:t>) </a:t>
             </a:r>
             <a:r>
               <a:rPr lang="hu-HU" dirty="0" err="1" smtClean="0"/>
@@ -16542,7 +16694,11 @@
             </a:r>
             <a:r>
               <a:rPr lang="hu-HU" dirty="0" smtClean="0"/>
-              <a:t> top of </a:t>
+              <a:t> </a:t>
+            </a:r>
+            <a:r>
+              <a:rPr lang="hu-HU" dirty="0" smtClean="0"/>
+              <a:t>top of </a:t>
             </a:r>
             <a:r>
               <a:rPr lang="hu-HU" dirty="0" err="1" smtClean="0"/>
@@ -16553,12 +16709,8 @@
               <a:t> output </a:t>
             </a:r>
             <a:r>
-              <a:rPr lang="hu-HU" dirty="0" err="1" smtClean="0"/>
-              <a:t>layer</a:t>
-            </a:r>
-            <a:r>
-              <a:rPr lang="hu-HU" dirty="0" smtClean="0"/>
-              <a:t> of </a:t>
+              <a:rPr lang="hu-HU" dirty="0" smtClean="0"/>
+              <a:t>of </a:t>
             </a:r>
             <a:r>
               <a:rPr lang="hu-HU" dirty="0" err="1" smtClean="0"/>
@@ -16783,6 +16935,110 @@
             </a:r>
             <a:r>
               <a:rPr lang="hu-HU" dirty="0" smtClean="0"/>
+              <a:t> (</a:t>
+            </a:r>
+            <a:r>
+              <a:rPr lang="hu-HU" dirty="0" err="1" smtClean="0"/>
+              <a:t>e.g</a:t>
+            </a:r>
+            <a:r>
+              <a:rPr lang="hu-HU" dirty="0" smtClean="0"/>
+              <a:t>. </a:t>
+            </a:r>
+            <a:r>
+              <a:rPr lang="hu-HU" i="1" dirty="0" err="1" smtClean="0"/>
+              <a:t>ship</a:t>
+            </a:r>
+            <a:r>
+              <a:rPr lang="hu-HU" dirty="0" smtClean="0"/>
+              <a:t>) an output </a:t>
+            </a:r>
+            <a:r>
+              <a:rPr lang="hu-HU" dirty="0" err="1" smtClean="0"/>
+              <a:t>vector</a:t>
+            </a:r>
+            <a:r>
+              <a:rPr lang="hu-HU" dirty="0" smtClean="0"/>
+              <a:t> </a:t>
+            </a:r>
+            <a:r>
+              <a:rPr lang="hu-HU" dirty="0" err="1" smtClean="0"/>
+              <a:t>that</a:t>
+            </a:r>
+            <a:r>
+              <a:rPr lang="hu-HU" dirty="0" smtClean="0"/>
+              <a:t> has a 1 </a:t>
+            </a:r>
+            <a:r>
+              <a:rPr lang="hu-HU" dirty="0" err="1" smtClean="0"/>
+              <a:t>value</a:t>
+            </a:r>
+            <a:r>
+              <a:rPr lang="hu-HU" dirty="0" smtClean="0"/>
+              <a:t> </a:t>
+            </a:r>
+            <a:r>
+              <a:rPr lang="hu-HU" dirty="0" err="1" smtClean="0"/>
+              <a:t>in</a:t>
+            </a:r>
+            <a:r>
+              <a:rPr lang="hu-HU" dirty="0" smtClean="0"/>
+              <a:t> </a:t>
+            </a:r>
+            <a:r>
+              <a:rPr lang="hu-HU" dirty="0" err="1" smtClean="0"/>
+              <a:t>the</a:t>
+            </a:r>
+            <a:r>
+              <a:rPr lang="hu-HU" dirty="0" smtClean="0"/>
+              <a:t> </a:t>
+            </a:r>
+            <a:r>
+              <a:rPr lang="hu-HU" dirty="0" err="1" smtClean="0"/>
+              <a:t>coordinate</a:t>
+            </a:r>
+            <a:r>
+              <a:rPr lang="hu-HU" dirty="0" smtClean="0"/>
+              <a:t> of </a:t>
+            </a:r>
+            <a:r>
+              <a:rPr lang="hu-HU" dirty="0" err="1" smtClean="0"/>
+              <a:t>the</a:t>
+            </a:r>
+            <a:r>
+              <a:rPr lang="hu-HU" dirty="0" smtClean="0"/>
+              <a:t> </a:t>
+            </a:r>
+            <a:r>
+              <a:rPr lang="hu-HU" dirty="0" err="1" smtClean="0"/>
+              <a:t>V-dimensional</a:t>
+            </a:r>
+            <a:r>
+              <a:rPr lang="hu-HU" dirty="0" smtClean="0"/>
+              <a:t> output </a:t>
+            </a:r>
+            <a:r>
+              <a:rPr lang="hu-HU" dirty="0" err="1" smtClean="0"/>
+              <a:t>vector</a:t>
+            </a:r>
+            <a:r>
+              <a:rPr lang="hu-HU" dirty="0" smtClean="0"/>
+              <a:t> </a:t>
+            </a:r>
+            <a:r>
+              <a:rPr lang="hu-HU" dirty="0" err="1" smtClean="0"/>
+              <a:t>that</a:t>
+            </a:r>
+            <a:r>
+              <a:rPr lang="hu-HU" dirty="0" smtClean="0"/>
+              <a:t> </a:t>
+            </a:r>
+            <a:r>
+              <a:rPr lang="hu-HU" dirty="0" err="1" smtClean="0"/>
+              <a:t>corresponds</a:t>
+            </a:r>
+            <a:r>
+              <a:rPr lang="hu-HU" dirty="0" smtClean="0"/>
               <a:t> </a:t>
             </a:r>
             <a:r>
@@ -16791,56 +17047,37 @@
             </a:r>
             <a:r>
               <a:rPr lang="hu-HU" dirty="0" smtClean="0"/>
-              <a:t> a 1 </a:t>
-            </a:r>
-            <a:r>
-              <a:rPr lang="hu-HU" dirty="0" err="1" smtClean="0"/>
-              <a:t>value</a:t>
-            </a:r>
-            <a:r>
-              <a:rPr lang="hu-HU" dirty="0" smtClean="0"/>
-              <a:t> </a:t>
-            </a:r>
-            <a:r>
-              <a:rPr lang="hu-HU" dirty="0" err="1" smtClean="0"/>
-              <a:t>in</a:t>
-            </a:r>
-            <a:r>
-              <a:rPr lang="hu-HU" dirty="0" smtClean="0"/>
-              <a:t> </a:t>
-            </a:r>
-            <a:r>
-              <a:rPr lang="hu-HU" dirty="0" err="1" smtClean="0"/>
-              <a:t>the</a:t>
-            </a:r>
-            <a:r>
-              <a:rPr lang="hu-HU" dirty="0" smtClean="0"/>
-              <a:t> </a:t>
-            </a:r>
-            <a:r>
-              <a:rPr lang="hu-HU" dirty="0" err="1" smtClean="0"/>
-              <a:t>correct</a:t>
-            </a:r>
-            <a:r>
-              <a:rPr lang="hu-HU" dirty="0" smtClean="0"/>
-              <a:t> </a:t>
-            </a:r>
-            <a:r>
-              <a:rPr lang="hu-HU" dirty="0" err="1" smtClean="0"/>
-              <a:t>coordinate</a:t>
-            </a:r>
-            <a:r>
-              <a:rPr lang="hu-HU" dirty="0" smtClean="0"/>
-              <a:t> of </a:t>
-            </a:r>
-            <a:r>
-              <a:rPr lang="hu-HU" dirty="0" err="1" smtClean="0"/>
-              <a:t>the</a:t>
-            </a:r>
-            <a:r>
-              <a:rPr lang="hu-HU" dirty="0" smtClean="0"/>
-              <a:t> output</a:t>
-            </a:r>
+              <a:t> </a:t>
+            </a:r>
+            <a:r>
+              <a:rPr lang="hu-HU" dirty="0" err="1" smtClean="0"/>
+              <a:t>that</a:t>
+            </a:r>
+            <a:r>
+              <a:rPr lang="hu-HU" dirty="0" smtClean="0"/>
+              <a:t> </a:t>
+            </a:r>
+            <a:r>
+              <a:rPr lang="hu-HU" dirty="0" err="1" smtClean="0"/>
+              <a:t>token</a:t>
+            </a:r>
+            <a:r>
+              <a:rPr lang="hu-HU" dirty="0" smtClean="0"/>
+              <a:t>, 0 </a:t>
+            </a:r>
+            <a:r>
+              <a:rPr lang="hu-HU" dirty="0" err="1" smtClean="0"/>
+              <a:t>everywhere</a:t>
+            </a:r>
+            <a:r>
+              <a:rPr lang="hu-HU" dirty="0" smtClean="0"/>
+              <a:t> </a:t>
+            </a:r>
+            <a:r>
+              <a:rPr lang="hu-HU" dirty="0" err="1" smtClean="0"/>
+              <a:t>else</a:t>
+            </a:r>
+            <a:endParaRPr lang="hu-HU" dirty="0" smtClean="0"/>
           </a:p>
           <a:p>
             <a:pPr lvl="3"/>
@@ -17931,8 +18168,12 @@
               <a:t>(2019) and </a:t>
             </a:r>
             <a:r>
+              <a:rPr lang="hu-HU" b="1" dirty="0" smtClean="0"/>
+              <a:t>Modern </a:t>
+            </a:r>
+            <a:r>
               <a:rPr lang="hu-HU" b="1" dirty="0" err="1" smtClean="0"/>
-              <a:t>ModernBert</a:t>
+              <a:t>BERT</a:t>
             </a:r>
             <a:r>
               <a:rPr lang="hu-HU" b="1" dirty="0" smtClean="0"/>

</xml_diff>